<commit_message>
Notebooks con notación actualizada
</commit_message>
<xml_diff>
--- a/R1.Intro_Regression/figs/Figs.pptx
+++ b/R1.Intro_Regression/figs/Figs.pptx
@@ -155,10 +155,9 @@
           </a:lstStyle>
           <a:p>
             <a:r>
-              <a:rPr lang="en-US" smtClean="0"/>
+              <a:rPr lang="en-US"/>
               <a:t>Click to edit Master title style</a:t>
             </a:r>
-            <a:endParaRPr lang="en-US"/>
           </a:p>
         </p:txBody>
       </p:sp>
@@ -220,10 +219,9 @@
           </a:lstStyle>
           <a:p>
             <a:r>
-              <a:rPr lang="en-US" smtClean="0"/>
+              <a:rPr lang="en-US"/>
               <a:t>Click to edit Master subtitle style</a:t>
             </a:r>
-            <a:endParaRPr lang="en-US"/>
           </a:p>
         </p:txBody>
       </p:sp>
@@ -244,7 +242,7 @@
           <a:p>
             <a:fld id="{CD89D5C7-A9AF-F84A-990C-55E12C397535}" type="datetimeFigureOut">
               <a:rPr lang="en-US" smtClean="0"/>
-              <a:t>9/12/16</a:t>
+              <a:t>9/18/19</a:t>
             </a:fld>
             <a:endParaRPr lang="en-US"/>
           </a:p>
@@ -338,10 +336,9 @@
           <a:lstStyle/>
           <a:p>
             <a:r>
-              <a:rPr lang="en-US" smtClean="0"/>
+              <a:rPr lang="en-US"/>
               <a:t>Click to edit Master title style</a:t>
             </a:r>
-            <a:endParaRPr lang="en-US"/>
           </a:p>
         </p:txBody>
       </p:sp>
@@ -362,38 +359,37 @@
           <a:p>
             <a:pPr lvl="0"/>
             <a:r>
-              <a:rPr lang="en-US" smtClean="0"/>
+              <a:rPr lang="en-US"/>
               <a:t>Click to edit Master text styles</a:t>
             </a:r>
           </a:p>
           <a:p>
             <a:pPr lvl="1"/>
             <a:r>
-              <a:rPr lang="en-US" smtClean="0"/>
+              <a:rPr lang="en-US"/>
               <a:t>Second level</a:t>
             </a:r>
           </a:p>
           <a:p>
             <a:pPr lvl="2"/>
             <a:r>
-              <a:rPr lang="en-US" smtClean="0"/>
+              <a:rPr lang="en-US"/>
               <a:t>Third level</a:t>
             </a:r>
           </a:p>
           <a:p>
             <a:pPr lvl="3"/>
             <a:r>
-              <a:rPr lang="en-US" smtClean="0"/>
+              <a:rPr lang="en-US"/>
               <a:t>Fourth level</a:t>
             </a:r>
           </a:p>
           <a:p>
             <a:pPr lvl="4"/>
             <a:r>
-              <a:rPr lang="en-US" smtClean="0"/>
+              <a:rPr lang="en-US"/>
               <a:t>Fifth level</a:t>
             </a:r>
-            <a:endParaRPr lang="en-US"/>
           </a:p>
         </p:txBody>
       </p:sp>
@@ -414,7 +410,7 @@
           <a:p>
             <a:fld id="{CD89D5C7-A9AF-F84A-990C-55E12C397535}" type="datetimeFigureOut">
               <a:rPr lang="en-US" smtClean="0"/>
-              <a:t>9/12/16</a:t>
+              <a:t>9/18/19</a:t>
             </a:fld>
             <a:endParaRPr lang="en-US"/>
           </a:p>
@@ -513,10 +509,9 @@
           <a:lstStyle/>
           <a:p>
             <a:r>
-              <a:rPr lang="en-US" smtClean="0"/>
+              <a:rPr lang="en-US"/>
               <a:t>Click to edit Master title style</a:t>
             </a:r>
-            <a:endParaRPr lang="en-US"/>
           </a:p>
         </p:txBody>
       </p:sp>
@@ -542,38 +537,37 @@
           <a:p>
             <a:pPr lvl="0"/>
             <a:r>
-              <a:rPr lang="en-US" smtClean="0"/>
+              <a:rPr lang="en-US"/>
               <a:t>Click to edit Master text styles</a:t>
             </a:r>
           </a:p>
           <a:p>
             <a:pPr lvl="1"/>
             <a:r>
-              <a:rPr lang="en-US" smtClean="0"/>
+              <a:rPr lang="en-US"/>
               <a:t>Second level</a:t>
             </a:r>
           </a:p>
           <a:p>
             <a:pPr lvl="2"/>
             <a:r>
-              <a:rPr lang="en-US" smtClean="0"/>
+              <a:rPr lang="en-US"/>
               <a:t>Third level</a:t>
             </a:r>
           </a:p>
           <a:p>
             <a:pPr lvl="3"/>
             <a:r>
-              <a:rPr lang="en-US" smtClean="0"/>
+              <a:rPr lang="en-US"/>
               <a:t>Fourth level</a:t>
             </a:r>
           </a:p>
           <a:p>
             <a:pPr lvl="4"/>
             <a:r>
-              <a:rPr lang="en-US" smtClean="0"/>
+              <a:rPr lang="en-US"/>
               <a:t>Fifth level</a:t>
             </a:r>
-            <a:endParaRPr lang="en-US"/>
           </a:p>
         </p:txBody>
       </p:sp>
@@ -594,7 +588,7 @@
           <a:p>
             <a:fld id="{CD89D5C7-A9AF-F84A-990C-55E12C397535}" type="datetimeFigureOut">
               <a:rPr lang="en-US" smtClean="0"/>
-              <a:t>9/12/16</a:t>
+              <a:t>9/18/19</a:t>
             </a:fld>
             <a:endParaRPr lang="en-US"/>
           </a:p>
@@ -688,10 +682,9 @@
           <a:lstStyle/>
           <a:p>
             <a:r>
-              <a:rPr lang="en-US" smtClean="0"/>
+              <a:rPr lang="en-US"/>
               <a:t>Click to edit Master title style</a:t>
             </a:r>
-            <a:endParaRPr lang="en-US"/>
           </a:p>
         </p:txBody>
       </p:sp>
@@ -712,38 +705,37 @@
           <a:p>
             <a:pPr lvl="0"/>
             <a:r>
-              <a:rPr lang="en-US" smtClean="0"/>
+              <a:rPr lang="en-US"/>
               <a:t>Click to edit Master text styles</a:t>
             </a:r>
           </a:p>
           <a:p>
             <a:pPr lvl="1"/>
             <a:r>
-              <a:rPr lang="en-US" smtClean="0"/>
+              <a:rPr lang="en-US"/>
               <a:t>Second level</a:t>
             </a:r>
           </a:p>
           <a:p>
             <a:pPr lvl="2"/>
             <a:r>
-              <a:rPr lang="en-US" smtClean="0"/>
+              <a:rPr lang="en-US"/>
               <a:t>Third level</a:t>
             </a:r>
           </a:p>
           <a:p>
             <a:pPr lvl="3"/>
             <a:r>
-              <a:rPr lang="en-US" smtClean="0"/>
+              <a:rPr lang="en-US"/>
               <a:t>Fourth level</a:t>
             </a:r>
           </a:p>
           <a:p>
             <a:pPr lvl="4"/>
             <a:r>
-              <a:rPr lang="en-US" smtClean="0"/>
+              <a:rPr lang="en-US"/>
               <a:t>Fifth level</a:t>
             </a:r>
-            <a:endParaRPr lang="en-US"/>
           </a:p>
         </p:txBody>
       </p:sp>
@@ -764,7 +756,7 @@
           <a:p>
             <a:fld id="{CD89D5C7-A9AF-F84A-990C-55E12C397535}" type="datetimeFigureOut">
               <a:rPr lang="en-US" smtClean="0"/>
-              <a:t>9/12/16</a:t>
+              <a:t>9/18/19</a:t>
             </a:fld>
             <a:endParaRPr lang="en-US"/>
           </a:p>
@@ -867,10 +859,9 @@
           </a:lstStyle>
           <a:p>
             <a:r>
-              <a:rPr lang="en-US" smtClean="0"/>
+              <a:rPr lang="en-US"/>
               <a:t>Click to edit Master title style</a:t>
             </a:r>
-            <a:endParaRPr lang="en-US"/>
           </a:p>
         </p:txBody>
       </p:sp>
@@ -987,7 +978,7 @@
           <a:p>
             <a:pPr lvl="0"/>
             <a:r>
-              <a:rPr lang="en-US" smtClean="0"/>
+              <a:rPr lang="en-US"/>
               <a:t>Click to edit Master text styles</a:t>
             </a:r>
           </a:p>
@@ -1010,7 +1001,7 @@
           <a:p>
             <a:fld id="{CD89D5C7-A9AF-F84A-990C-55E12C397535}" type="datetimeFigureOut">
               <a:rPr lang="en-US" smtClean="0"/>
-              <a:t>9/12/16</a:t>
+              <a:t>9/18/19</a:t>
             </a:fld>
             <a:endParaRPr lang="en-US"/>
           </a:p>
@@ -1104,10 +1095,9 @@
           <a:lstStyle/>
           <a:p>
             <a:r>
-              <a:rPr lang="en-US" smtClean="0"/>
+              <a:rPr lang="en-US"/>
               <a:t>Click to edit Master title style</a:t>
             </a:r>
-            <a:endParaRPr lang="en-US"/>
           </a:p>
         </p:txBody>
       </p:sp>
@@ -1133,38 +1123,37 @@
           <a:p>
             <a:pPr lvl="0"/>
             <a:r>
-              <a:rPr lang="en-US" smtClean="0"/>
+              <a:rPr lang="en-US"/>
               <a:t>Click to edit Master text styles</a:t>
             </a:r>
           </a:p>
           <a:p>
             <a:pPr lvl="1"/>
             <a:r>
-              <a:rPr lang="en-US" smtClean="0"/>
+              <a:rPr lang="en-US"/>
               <a:t>Second level</a:t>
             </a:r>
           </a:p>
           <a:p>
             <a:pPr lvl="2"/>
             <a:r>
-              <a:rPr lang="en-US" smtClean="0"/>
+              <a:rPr lang="en-US"/>
               <a:t>Third level</a:t>
             </a:r>
           </a:p>
           <a:p>
             <a:pPr lvl="3"/>
             <a:r>
-              <a:rPr lang="en-US" smtClean="0"/>
+              <a:rPr lang="en-US"/>
               <a:t>Fourth level</a:t>
             </a:r>
           </a:p>
           <a:p>
             <a:pPr lvl="4"/>
             <a:r>
-              <a:rPr lang="en-US" smtClean="0"/>
+              <a:rPr lang="en-US"/>
               <a:t>Fifth level</a:t>
             </a:r>
-            <a:endParaRPr lang="en-US"/>
           </a:p>
         </p:txBody>
       </p:sp>
@@ -1190,38 +1179,37 @@
           <a:p>
             <a:pPr lvl="0"/>
             <a:r>
-              <a:rPr lang="en-US" smtClean="0"/>
+              <a:rPr lang="en-US"/>
               <a:t>Click to edit Master text styles</a:t>
             </a:r>
           </a:p>
           <a:p>
             <a:pPr lvl="1"/>
             <a:r>
-              <a:rPr lang="en-US" smtClean="0"/>
+              <a:rPr lang="en-US"/>
               <a:t>Second level</a:t>
             </a:r>
           </a:p>
           <a:p>
             <a:pPr lvl="2"/>
             <a:r>
-              <a:rPr lang="en-US" smtClean="0"/>
+              <a:rPr lang="en-US"/>
               <a:t>Third level</a:t>
             </a:r>
           </a:p>
           <a:p>
             <a:pPr lvl="3"/>
             <a:r>
-              <a:rPr lang="en-US" smtClean="0"/>
+              <a:rPr lang="en-US"/>
               <a:t>Fourth level</a:t>
             </a:r>
           </a:p>
           <a:p>
             <a:pPr lvl="4"/>
             <a:r>
-              <a:rPr lang="en-US" smtClean="0"/>
+              <a:rPr lang="en-US"/>
               <a:t>Fifth level</a:t>
             </a:r>
-            <a:endParaRPr lang="en-US"/>
           </a:p>
         </p:txBody>
       </p:sp>
@@ -1242,7 +1230,7 @@
           <a:p>
             <a:fld id="{CD89D5C7-A9AF-F84A-990C-55E12C397535}" type="datetimeFigureOut">
               <a:rPr lang="en-US" smtClean="0"/>
-              <a:t>9/12/16</a:t>
+              <a:t>9/18/19</a:t>
             </a:fld>
             <a:endParaRPr lang="en-US"/>
           </a:p>
@@ -1341,10 +1329,9 @@
           <a:lstStyle/>
           <a:p>
             <a:r>
-              <a:rPr lang="en-US" smtClean="0"/>
+              <a:rPr lang="en-US"/>
               <a:t>Click to edit Master title style</a:t>
             </a:r>
-            <a:endParaRPr lang="en-US"/>
           </a:p>
         </p:txBody>
       </p:sp>
@@ -1407,7 +1394,7 @@
           <a:p>
             <a:pPr lvl="0"/>
             <a:r>
-              <a:rPr lang="en-US" smtClean="0"/>
+              <a:rPr lang="en-US"/>
               <a:t>Click to edit Master text styles</a:t>
             </a:r>
           </a:p>
@@ -1435,38 +1422,37 @@
           <a:p>
             <a:pPr lvl="0"/>
             <a:r>
-              <a:rPr lang="en-US" smtClean="0"/>
+              <a:rPr lang="en-US"/>
               <a:t>Click to edit Master text styles</a:t>
             </a:r>
           </a:p>
           <a:p>
             <a:pPr lvl="1"/>
             <a:r>
-              <a:rPr lang="en-US" smtClean="0"/>
+              <a:rPr lang="en-US"/>
               <a:t>Second level</a:t>
             </a:r>
           </a:p>
           <a:p>
             <a:pPr lvl="2"/>
             <a:r>
-              <a:rPr lang="en-US" smtClean="0"/>
+              <a:rPr lang="en-US"/>
               <a:t>Third level</a:t>
             </a:r>
           </a:p>
           <a:p>
             <a:pPr lvl="3"/>
             <a:r>
-              <a:rPr lang="en-US" smtClean="0"/>
+              <a:rPr lang="en-US"/>
               <a:t>Fourth level</a:t>
             </a:r>
           </a:p>
           <a:p>
             <a:pPr lvl="4"/>
             <a:r>
-              <a:rPr lang="en-US" smtClean="0"/>
+              <a:rPr lang="en-US"/>
               <a:t>Fifth level</a:t>
             </a:r>
-            <a:endParaRPr lang="en-US"/>
           </a:p>
         </p:txBody>
       </p:sp>
@@ -1529,7 +1515,7 @@
           <a:p>
             <a:pPr lvl="0"/>
             <a:r>
-              <a:rPr lang="en-US" smtClean="0"/>
+              <a:rPr lang="en-US"/>
               <a:t>Click to edit Master text styles</a:t>
             </a:r>
           </a:p>
@@ -1557,38 +1543,37 @@
           <a:p>
             <a:pPr lvl="0"/>
             <a:r>
-              <a:rPr lang="en-US" smtClean="0"/>
+              <a:rPr lang="en-US"/>
               <a:t>Click to edit Master text styles</a:t>
             </a:r>
           </a:p>
           <a:p>
             <a:pPr lvl="1"/>
             <a:r>
-              <a:rPr lang="en-US" smtClean="0"/>
+              <a:rPr lang="en-US"/>
               <a:t>Second level</a:t>
             </a:r>
           </a:p>
           <a:p>
             <a:pPr lvl="2"/>
             <a:r>
-              <a:rPr lang="en-US" smtClean="0"/>
+              <a:rPr lang="en-US"/>
               <a:t>Third level</a:t>
             </a:r>
           </a:p>
           <a:p>
             <a:pPr lvl="3"/>
             <a:r>
-              <a:rPr lang="en-US" smtClean="0"/>
+              <a:rPr lang="en-US"/>
               <a:t>Fourth level</a:t>
             </a:r>
           </a:p>
           <a:p>
             <a:pPr lvl="4"/>
             <a:r>
-              <a:rPr lang="en-US" smtClean="0"/>
+              <a:rPr lang="en-US"/>
               <a:t>Fifth level</a:t>
             </a:r>
-            <a:endParaRPr lang="en-US"/>
           </a:p>
         </p:txBody>
       </p:sp>
@@ -1609,7 +1594,7 @@
           <a:p>
             <a:fld id="{CD89D5C7-A9AF-F84A-990C-55E12C397535}" type="datetimeFigureOut">
               <a:rPr lang="en-US" smtClean="0"/>
-              <a:t>9/12/16</a:t>
+              <a:t>9/18/19</a:t>
             </a:fld>
             <a:endParaRPr lang="en-US"/>
           </a:p>
@@ -1703,10 +1688,9 @@
           <a:lstStyle/>
           <a:p>
             <a:r>
-              <a:rPr lang="en-US" smtClean="0"/>
+              <a:rPr lang="en-US"/>
               <a:t>Click to edit Master title style</a:t>
             </a:r>
-            <a:endParaRPr lang="en-US"/>
           </a:p>
         </p:txBody>
       </p:sp>
@@ -1727,7 +1711,7 @@
           <a:p>
             <a:fld id="{CD89D5C7-A9AF-F84A-990C-55E12C397535}" type="datetimeFigureOut">
               <a:rPr lang="en-US" smtClean="0"/>
-              <a:t>9/12/16</a:t>
+              <a:t>9/18/19</a:t>
             </a:fld>
             <a:endParaRPr lang="en-US"/>
           </a:p>
@@ -1822,7 +1806,7 @@
           <a:p>
             <a:fld id="{CD89D5C7-A9AF-F84A-990C-55E12C397535}" type="datetimeFigureOut">
               <a:rPr lang="en-US" smtClean="0"/>
-              <a:t>9/12/16</a:t>
+              <a:t>9/18/19</a:t>
             </a:fld>
             <a:endParaRPr lang="en-US"/>
           </a:p>
@@ -1925,10 +1909,9 @@
           </a:lstStyle>
           <a:p>
             <a:r>
-              <a:rPr lang="en-US" smtClean="0"/>
+              <a:rPr lang="en-US"/>
               <a:t>Click to edit Master title style</a:t>
             </a:r>
-            <a:endParaRPr lang="en-US"/>
           </a:p>
         </p:txBody>
       </p:sp>
@@ -1982,38 +1965,37 @@
           <a:p>
             <a:pPr lvl="0"/>
             <a:r>
-              <a:rPr lang="en-US" smtClean="0"/>
+              <a:rPr lang="en-US"/>
               <a:t>Click to edit Master text styles</a:t>
             </a:r>
           </a:p>
           <a:p>
             <a:pPr lvl="1"/>
             <a:r>
-              <a:rPr lang="en-US" smtClean="0"/>
+              <a:rPr lang="en-US"/>
               <a:t>Second level</a:t>
             </a:r>
           </a:p>
           <a:p>
             <a:pPr lvl="2"/>
             <a:r>
-              <a:rPr lang="en-US" smtClean="0"/>
+              <a:rPr lang="en-US"/>
               <a:t>Third level</a:t>
             </a:r>
           </a:p>
           <a:p>
             <a:pPr lvl="3"/>
             <a:r>
-              <a:rPr lang="en-US" smtClean="0"/>
+              <a:rPr lang="en-US"/>
               <a:t>Fourth level</a:t>
             </a:r>
           </a:p>
           <a:p>
             <a:pPr lvl="4"/>
             <a:r>
-              <a:rPr lang="en-US" smtClean="0"/>
+              <a:rPr lang="en-US"/>
               <a:t>Fifth level</a:t>
             </a:r>
-            <a:endParaRPr lang="en-US"/>
           </a:p>
         </p:txBody>
       </p:sp>
@@ -2076,7 +2058,7 @@
           <a:p>
             <a:pPr lvl="0"/>
             <a:r>
-              <a:rPr lang="en-US" smtClean="0"/>
+              <a:rPr lang="en-US"/>
               <a:t>Click to edit Master text styles</a:t>
             </a:r>
           </a:p>
@@ -2099,7 +2081,7 @@
           <a:p>
             <a:fld id="{CD89D5C7-A9AF-F84A-990C-55E12C397535}" type="datetimeFigureOut">
               <a:rPr lang="en-US" smtClean="0"/>
-              <a:t>9/12/16</a:t>
+              <a:t>9/18/19</a:t>
             </a:fld>
             <a:endParaRPr lang="en-US"/>
           </a:p>
@@ -2202,10 +2184,9 @@
           </a:lstStyle>
           <a:p>
             <a:r>
-              <a:rPr lang="en-US" smtClean="0"/>
+              <a:rPr lang="en-US"/>
               <a:t>Click to edit Master title style</a:t>
             </a:r>
-            <a:endParaRPr lang="en-US"/>
           </a:p>
         </p:txBody>
       </p:sp>
@@ -2329,7 +2310,7 @@
           <a:p>
             <a:pPr lvl="0"/>
             <a:r>
-              <a:rPr lang="en-US" smtClean="0"/>
+              <a:rPr lang="en-US"/>
               <a:t>Click to edit Master text styles</a:t>
             </a:r>
           </a:p>
@@ -2352,7 +2333,7 @@
           <a:p>
             <a:fld id="{CD89D5C7-A9AF-F84A-990C-55E12C397535}" type="datetimeFigureOut">
               <a:rPr lang="en-US" smtClean="0"/>
-              <a:t>9/12/16</a:t>
+              <a:t>9/18/19</a:t>
             </a:fld>
             <a:endParaRPr lang="en-US"/>
           </a:p>
@@ -2461,10 +2442,9 @@
           <a:lstStyle/>
           <a:p>
             <a:r>
-              <a:rPr lang="en-US" smtClean="0"/>
+              <a:rPr lang="en-US"/>
               <a:t>Click to edit Master title style</a:t>
             </a:r>
-            <a:endParaRPr lang="en-US"/>
           </a:p>
         </p:txBody>
       </p:sp>
@@ -2495,38 +2475,37 @@
           <a:p>
             <a:pPr lvl="0"/>
             <a:r>
-              <a:rPr lang="en-US" smtClean="0"/>
+              <a:rPr lang="en-US"/>
               <a:t>Click to edit Master text styles</a:t>
             </a:r>
           </a:p>
           <a:p>
             <a:pPr lvl="1"/>
             <a:r>
-              <a:rPr lang="en-US" smtClean="0"/>
+              <a:rPr lang="en-US"/>
               <a:t>Second level</a:t>
             </a:r>
           </a:p>
           <a:p>
             <a:pPr lvl="2"/>
             <a:r>
-              <a:rPr lang="en-US" smtClean="0"/>
+              <a:rPr lang="en-US"/>
               <a:t>Third level</a:t>
             </a:r>
           </a:p>
           <a:p>
             <a:pPr lvl="3"/>
             <a:r>
-              <a:rPr lang="en-US" smtClean="0"/>
+              <a:rPr lang="en-US"/>
               <a:t>Fourth level</a:t>
             </a:r>
           </a:p>
           <a:p>
             <a:pPr lvl="4"/>
             <a:r>
-              <a:rPr lang="en-US" smtClean="0"/>
+              <a:rPr lang="en-US"/>
               <a:t>Fifth level</a:t>
             </a:r>
-            <a:endParaRPr lang="en-US"/>
           </a:p>
         </p:txBody>
       </p:sp>
@@ -2565,7 +2544,7 @@
           <a:p>
             <a:fld id="{CD89D5C7-A9AF-F84A-990C-55E12C397535}" type="datetimeFigureOut">
               <a:rPr lang="en-US" smtClean="0"/>
-              <a:t>9/12/16</a:t>
+              <a:t>9/18/19</a:t>
             </a:fld>
             <a:endParaRPr lang="en-US"/>
           </a:p>
@@ -3007,18 +2986,13 @@
             <a:lstStyle/>
             <a:p>
               <a:r>
-                <a:rPr lang="en-US" b="1" dirty="0" smtClean="0">
+                <a:rPr lang="en-US" b="1" dirty="0">
                   <a:latin typeface="Times New Roman" charset="0"/>
                   <a:ea typeface="Times New Roman" charset="0"/>
                   <a:cs typeface="Times New Roman" charset="0"/>
                 </a:rPr>
                 <a:t>x</a:t>
               </a:r>
-              <a:endParaRPr lang="en-US" b="1" dirty="0">
-                <a:latin typeface="Times New Roman" charset="0"/>
-                <a:ea typeface="Times New Roman" charset="0"/>
-                <a:cs typeface="Times New Roman" charset="0"/>
-              </a:endParaRPr>
             </a:p>
           </p:txBody>
         </p:sp>
@@ -3058,7 +3032,7 @@
                             <m:chr m:val="̂"/>
                             <m:ctrlPr>
                               <a:rPr lang="el-GR" b="1" i="1" smtClean="0">
-                                <a:latin typeface="Cambria Math" charset="0"/>
+                                <a:latin typeface="Cambria Math" panose="02040503050406030204" pitchFamily="18" charset="0"/>
                                 <a:ea typeface="Times New Roman" charset="0"/>
                                 <a:cs typeface="Times New Roman" charset="0"/>
                               </a:rPr>
@@ -3095,7 +3069,7 @@
                           <m:dPr>
                             <m:ctrlPr>
                               <a:rPr lang="is-IS" b="1" i="1" smtClean="0">
-                                <a:latin typeface="Cambria Math" charset="0"/>
+                                <a:latin typeface="Cambria Math" panose="02040503050406030204" pitchFamily="18" charset="0"/>
                                 <a:ea typeface="Times New Roman" charset="0"/>
                                 <a:cs typeface="Times New Roman" charset="0"/>
                               </a:rPr>
@@ -3284,14 +3258,11 @@
             <a:p>
               <a:pPr algn="ctr"/>
               <a:r>
-                <a:rPr lang="en-US" dirty="0" smtClean="0">
+                <a:rPr lang="en-US" dirty="0">
                   <a:latin typeface="Apple Chancery" charset="0"/>
                 </a:rPr>
                 <a:t>D</a:t>
               </a:r>
-              <a:endParaRPr lang="en-US" dirty="0">
-                <a:latin typeface="Apple Chancery" charset="0"/>
-              </a:endParaRPr>
             </a:p>
           </p:txBody>
         </p:sp>
@@ -3337,10 +3308,9 @@
             <a:p>
               <a:pPr algn="ctr"/>
               <a:r>
-                <a:rPr lang="en-US" smtClean="0"/>
+                <a:rPr lang="en-US"/>
                 <a:t>Regression algorithm</a:t>
               </a:r>
-              <a:endParaRPr lang="en-US"/>
             </a:p>
           </p:txBody>
         </p:sp>
@@ -3558,7 +3528,7 @@
             <a:p>
               <a:pPr algn="ctr"/>
               <a:r>
-                <a:rPr lang="en-US" dirty="0" smtClean="0"/>
+                <a:rPr lang="en-US" dirty="0"/>
                 <a:t>Predictor</a:t>
               </a:r>
             </a:p>
@@ -3575,13 +3545,6 @@
   <p:clrMapOvr>
     <a:masterClrMapping/>
   </p:clrMapOvr>
-  <p:timing>
-    <p:tnLst>
-      <p:par>
-        <p:cTn id="1" dur="indefinite" restart="never" nodeType="tmRoot"/>
-      </p:par>
-    </p:tnLst>
-  </p:timing>
 </p:sld>
 </file>
 
@@ -3664,10 +3627,9 @@
             <a:p>
               <a:pPr algn="ctr"/>
               <a:r>
-                <a:rPr lang="en-US" dirty="0" smtClean="0"/>
+                <a:rPr lang="en-US" dirty="0"/>
                 <a:t>Sensor 1</a:t>
               </a:r>
-              <a:endParaRPr lang="en-US" dirty="0"/>
             </a:p>
           </p:txBody>
         </p:sp>
@@ -3719,14 +3681,9 @@
             <a:p>
               <a:pPr algn="ctr"/>
               <a:r>
-                <a:rPr lang="en-US" dirty="0" smtClean="0"/>
-                <a:t>Sensor </a:t>
+                <a:rPr lang="en-US" dirty="0"/>
+                <a:t>Sensor 2</a:t>
               </a:r>
-              <a:r>
-                <a:rPr lang="en-US" dirty="0" smtClean="0"/>
-                <a:t>2</a:t>
-              </a:r>
-              <a:endParaRPr lang="en-US" dirty="0"/>
             </a:p>
           </p:txBody>
         </p:sp>
@@ -3778,22 +3735,17 @@
             <a:p>
               <a:pPr algn="ctr"/>
               <a:r>
-                <a:rPr lang="en-US" dirty="0" smtClean="0"/>
+                <a:rPr lang="en-US" dirty="0"/>
                 <a:t>Sensor </a:t>
               </a:r>
               <a:r>
-                <a:rPr lang="en-US" i="1" dirty="0" smtClean="0">
+                <a:rPr lang="en-US" i="1" dirty="0">
                   <a:latin typeface="Times New Roman" charset="0"/>
                   <a:ea typeface="Times New Roman" charset="0"/>
                   <a:cs typeface="Times New Roman" charset="0"/>
                 </a:rPr>
                 <a:t>N</a:t>
               </a:r>
-              <a:endParaRPr lang="en-US" i="1" dirty="0">
-                <a:latin typeface="Times New Roman" charset="0"/>
-                <a:ea typeface="Times New Roman" charset="0"/>
-                <a:cs typeface="Times New Roman" charset="0"/>
-              </a:endParaRPr>
             </a:p>
           </p:txBody>
         </p:sp>
@@ -4094,10 +4046,9 @@
             <a:p>
               <a:pPr algn="ctr"/>
               <a:r>
-                <a:rPr lang="en-US" dirty="0" smtClean="0"/>
+                <a:rPr lang="en-US" dirty="0"/>
                 <a:t>Prediction</a:t>
               </a:r>
-              <a:endParaRPr lang="en-US" dirty="0"/>
             </a:p>
           </p:txBody>
         </p:sp>
@@ -4280,7 +4231,7 @@
             <a:lstStyle/>
             <a:p>
               <a:r>
-                <a:rPr lang="en-US" sz="2400" i="1" dirty="0" smtClean="0">
+                <a:rPr lang="en-US" sz="2400" i="1" dirty="0">
                   <a:latin typeface="Times New Roman" charset="0"/>
                   <a:ea typeface="Times New Roman" charset="0"/>
                   <a:cs typeface="Times New Roman" charset="0"/>
@@ -4352,7 +4303,7 @@
             <a:lstStyle/>
             <a:p>
               <a:r>
-                <a:rPr lang="en-US" sz="2400" i="1" dirty="0" smtClean="0">
+                <a:rPr lang="en-US" sz="2400" i="1" dirty="0">
                   <a:latin typeface="Times New Roman" charset="0"/>
                   <a:ea typeface="Times New Roman" charset="0"/>
                   <a:cs typeface="Times New Roman" charset="0"/>
@@ -4360,12 +4311,12 @@
                 <a:t>x</a:t>
               </a:r>
               <a:r>
-                <a:rPr lang="en-US" sz="2400" baseline="-25000" dirty="0" smtClean="0">
+                <a:rPr lang="en-US" sz="2400" baseline="-25000" dirty="0">
                   <a:latin typeface="Times New Roman" charset="0"/>
                   <a:ea typeface="Times New Roman" charset="0"/>
                   <a:cs typeface="Times New Roman" charset="0"/>
                 </a:rPr>
-                <a:t>1</a:t>
+                <a:t>0</a:t>
               </a:r>
             </a:p>
           </p:txBody>
@@ -4393,7 +4344,7 @@
             <a:lstStyle/>
             <a:p>
               <a:r>
-                <a:rPr lang="en-US" sz="2400" i="1" dirty="0" smtClean="0">
+                <a:rPr lang="en-US" sz="2400" i="1" dirty="0">
                   <a:latin typeface="Times New Roman" charset="0"/>
                   <a:ea typeface="Times New Roman" charset="0"/>
                   <a:cs typeface="Times New Roman" charset="0"/>
@@ -4401,12 +4352,12 @@
                 <a:t>x</a:t>
               </a:r>
               <a:r>
-                <a:rPr lang="en-US" sz="2400" baseline="-25000" dirty="0" smtClean="0">
+                <a:rPr lang="en-US" sz="2400" baseline="-25000" dirty="0">
                   <a:latin typeface="Times New Roman" charset="0"/>
                   <a:ea typeface="Times New Roman" charset="0"/>
                   <a:cs typeface="Times New Roman" charset="0"/>
                 </a:rPr>
-                <a:t>2</a:t>
+                <a:t>1</a:t>
               </a:r>
             </a:p>
           </p:txBody>
@@ -4419,8 +4370,8 @@
           </p:nvSpPr>
           <p:spPr>
             <a:xfrm>
-              <a:off x="6090996" y="2254050"/>
-              <a:ext cx="457176" cy="461665"/>
+              <a:off x="6010986" y="2254050"/>
+              <a:ext cx="639919" cy="461665"/>
             </a:xfrm>
             <a:prstGeom prst="rect">
               <a:avLst/>
@@ -4434,7 +4385,7 @@
             <a:lstStyle/>
             <a:p>
               <a:r>
-                <a:rPr lang="en-US" sz="2400" i="1" dirty="0" smtClean="0">
+                <a:rPr lang="en-US" sz="2400" i="1" dirty="0">
                   <a:latin typeface="Times New Roman" charset="0"/>
                   <a:ea typeface="Times New Roman" charset="0"/>
                   <a:cs typeface="Times New Roman" charset="0"/>
@@ -4442,12 +4393,12 @@
                 <a:t>x</a:t>
               </a:r>
               <a:r>
-                <a:rPr lang="en-US" sz="2400" i="1" baseline="-25000" dirty="0" smtClean="0">
+                <a:rPr lang="en-US" sz="2400" i="1" baseline="-25000" dirty="0">
                   <a:latin typeface="Times New Roman" charset="0"/>
                   <a:ea typeface="Times New Roman" charset="0"/>
                   <a:cs typeface="Times New Roman" charset="0"/>
                 </a:rPr>
-                <a:t>N</a:t>
+                <a:t>m-1</a:t>
               </a:r>
             </a:p>
           </p:txBody>
@@ -4553,7 +4504,7 @@
             <a:lstStyle/>
             <a:p>
               <a:r>
-                <a:rPr lang="en-US" sz="2400" i="1" dirty="0" smtClean="0">
+                <a:rPr lang="en-US" sz="2400" i="1" dirty="0">
                   <a:latin typeface="Times New Roman" charset="0"/>
                   <a:ea typeface="Times New Roman" charset="0"/>
                   <a:cs typeface="Times New Roman" charset="0"/>
@@ -4598,10 +4549,9 @@
             <a:p>
               <a:pPr algn="ctr"/>
               <a:r>
-                <a:rPr lang="en-US" dirty="0" smtClean="0"/>
+                <a:rPr lang="en-US" dirty="0"/>
                 <a:t>“Measurable” World</a:t>
               </a:r>
-              <a:endParaRPr lang="en-US" dirty="0"/>
             </a:p>
           </p:txBody>
         </p:sp>

</xml_diff>